<commit_message>
preparations for the meeting after the first sprint
</commit_message>
<xml_diff>
--- a/Analyse.pptx
+++ b/Analyse.pptx
@@ -5,7 +5,7 @@
     <p:sldMasterId id="2147483660" r:id="rId1"/>
   </p:sldMasterIdLst>
   <p:notesMasterIdLst>
-    <p:notesMasterId r:id="rId30"/>
+    <p:notesMasterId r:id="rId31"/>
   </p:notesMasterIdLst>
   <p:sldIdLst>
     <p:sldId id="259" r:id="rId2"/>
@@ -36,6 +36,7 @@
     <p:sldId id="292" r:id="rId27"/>
     <p:sldId id="294" r:id="rId28"/>
     <p:sldId id="291" r:id="rId29"/>
+    <p:sldId id="295" r:id="rId30"/>
   </p:sldIdLst>
   <p:sldSz cx="17338675" cy="9753600"/>
   <p:notesSz cx="6858000" cy="9144000"/>
@@ -153,10 +154,6 @@
 </p:presentation>
 </file>
 
-<file path=ppt/revisionInfo.xml><?xml version="1.0" encoding="utf-8"?>
-<p1510:revInfo xmlns:a="http://schemas.openxmlformats.org/drawingml/2006/main" xmlns:r="http://schemas.openxmlformats.org/officeDocument/2006/relationships" xmlns:p1510="http://schemas.microsoft.com/office/powerpoint/2015/10/main"/>
-</file>
-
 <file path=ppt/notesMasters/notesMaster1.xml><?xml version="1.0" encoding="utf-8"?>
 <p:notesMaster xmlns:a="http://schemas.openxmlformats.org/drawingml/2006/main" xmlns:r="http://schemas.openxmlformats.org/officeDocument/2006/relationships" xmlns:p="http://schemas.openxmlformats.org/presentationml/2006/main">
   <p:cSld>
@@ -239,7 +236,7 @@
           <a:p>
             <a:fld id="{86680C0C-85DF-417F-8238-DB0D15743621}" type="datetimeFigureOut">
               <a:rPr lang="en-GB" smtClean="0"/>
-              <a:t>02/03/2018</a:t>
+              <a:t>18/04/2018</a:t>
             </a:fld>
             <a:endParaRPr lang="en-GB"/>
           </a:p>
@@ -398,7 +395,7 @@
           <a:p>
             <a:fld id="{539A0A48-EDB1-4AFE-B1B7-10CE2A416496}" type="slidenum">
               <a:rPr lang="en-GB" smtClean="0"/>
-              <a:t>‹nr.›</a:t>
+              <a:t>‹#›</a:t>
             </a:fld>
             <a:endParaRPr lang="en-GB"/>
           </a:p>
@@ -877,7 +874,7 @@
           <a:p>
             <a:fld id="{5A24147F-ED97-47AF-A1B3-C82A179CF7F3}" type="datetime1">
               <a:rPr lang="nl-NL" smtClean="0"/>
-              <a:t>2-3-2018</a:t>
+              <a:t>18-4-2018</a:t>
             </a:fld>
             <a:endParaRPr lang="en-GB"/>
           </a:p>
@@ -919,7 +916,7 @@
           <a:p>
             <a:fld id="{7AE184E0-0BD4-4705-A12B-9B71DDE63301}" type="slidenum">
               <a:rPr lang="en-GB" smtClean="0"/>
-              <a:t>‹nr.›</a:t>
+              <a:t>‹#›</a:t>
             </a:fld>
             <a:endParaRPr lang="en-GB"/>
           </a:p>
@@ -1702,7 +1699,7 @@
             <a:fld id="{7AE184E0-0BD4-4705-A12B-9B71DDE63301}" type="slidenum">
               <a:rPr lang="nl-BE" noProof="0" smtClean="0"/>
               <a:pPr/>
-              <a:t>‹nr.›</a:t>
+              <a:t>‹#›</a:t>
             </a:fld>
             <a:endParaRPr lang="nl-BE" noProof="0" dirty="0"/>
           </a:p>
@@ -1955,7 +1952,7 @@
           <a:p>
             <a:fld id="{25470885-0B31-4E06-AE71-7E16801F2838}" type="datetime1">
               <a:rPr lang="nl-BE" noProof="0" smtClean="0"/>
-              <a:t>2/03/2018</a:t>
+              <a:t>18/04/2018</a:t>
             </a:fld>
             <a:endParaRPr lang="nl-BE" noProof="0" dirty="0"/>
           </a:p>
@@ -1997,7 +1994,7 @@
           <a:p>
             <a:fld id="{7AE184E0-0BD4-4705-A12B-9B71DDE63301}" type="slidenum">
               <a:rPr lang="nl-BE" noProof="0" smtClean="0"/>
-              <a:t>‹nr.›</a:t>
+              <a:t>‹#›</a:t>
             </a:fld>
             <a:endParaRPr lang="nl-BE" noProof="0" dirty="0"/>
           </a:p>
@@ -2073,7 +2070,7 @@
           <a:p>
             <a:fld id="{E7410F60-8C93-4C37-B51A-4DDAE36F7E9B}" type="datetime1">
               <a:rPr lang="nl-BE" noProof="0" smtClean="0"/>
-              <a:t>2/03/2018</a:t>
+              <a:t>18/04/2018</a:t>
             </a:fld>
             <a:endParaRPr lang="nl-BE" noProof="0" dirty="0"/>
           </a:p>
@@ -2170,7 +2167,7 @@
             <a:fld id="{7AE184E0-0BD4-4705-A12B-9B71DDE63301}" type="slidenum">
               <a:rPr lang="nl-BE" noProof="0" smtClean="0"/>
               <a:pPr/>
-              <a:t>‹nr.›</a:t>
+              <a:t>‹#›</a:t>
             </a:fld>
             <a:endParaRPr lang="nl-BE" noProof="0" dirty="0"/>
           </a:p>
@@ -2352,7 +2349,7 @@
           <a:p>
             <a:fld id="{656594B6-17DF-4759-A7A5-128AFEA77F2C}" type="datetime1">
               <a:rPr lang="nl-BE" noProof="0" smtClean="0"/>
-              <a:t>2/03/2018</a:t>
+              <a:t>18/04/2018</a:t>
             </a:fld>
             <a:endParaRPr lang="nl-BE" noProof="0" dirty="0"/>
           </a:p>
@@ -2394,7 +2391,7 @@
           <a:p>
             <a:fld id="{7AE184E0-0BD4-4705-A12B-9B71DDE63301}" type="slidenum">
               <a:rPr lang="nl-BE" noProof="0" smtClean="0"/>
-              <a:t>‹nr.›</a:t>
+              <a:t>‹#›</a:t>
             </a:fld>
             <a:endParaRPr lang="nl-BE" noProof="0" dirty="0"/>
           </a:p>
@@ -2493,7 +2490,7 @@
           <a:p>
             <a:fld id="{66A81384-1200-4D40-BEF0-3A17A1F906F4}" type="datetime1">
               <a:rPr lang="nl-NL" noProof="0" smtClean="0"/>
-              <a:t>2-3-2018</a:t>
+              <a:t>18-4-2018</a:t>
             </a:fld>
             <a:endParaRPr lang="nl-NL" noProof="0" dirty="0"/>
           </a:p>
@@ -3034,7 +3031,7 @@
           <a:p>
             <a:fld id="{FA870D1A-A3AB-4E9F-892E-C45B5A80FDBF}" type="datetime1">
               <a:rPr lang="nl-BE" noProof="0" smtClean="0"/>
-              <a:t>2/03/2018</a:t>
+              <a:t>18/04/2018</a:t>
             </a:fld>
             <a:endParaRPr lang="nl-BE" noProof="0" dirty="0"/>
           </a:p>
@@ -3111,7 +3108,7 @@
             <a:fld id="{7AE184E0-0BD4-4705-A12B-9B71DDE63301}" type="slidenum">
               <a:rPr lang="nl-BE" noProof="0" smtClean="0"/>
               <a:pPr/>
-              <a:t>‹nr.›</a:t>
+              <a:t>‹#›</a:t>
             </a:fld>
             <a:endParaRPr lang="nl-BE" noProof="0" dirty="0"/>
           </a:p>
@@ -19877,10 +19874,10 @@
           <a:lstStyle/>
           <a:p>
             <a:r>
-              <a:rPr lang="nl-NL" dirty="0">
-                <a:latin typeface="UGent Panno Text" panose="02000506040000040003" pitchFamily="2" charset="0"/>
-              </a:rPr>
-              <a:t>Door Arthur </a:t>
+              <a:rPr lang="nl-NL">
+                <a:latin typeface="UGent Panno Text" panose="02000506040000040003" pitchFamily="2" charset="0"/>
+              </a:rPr>
+              <a:t>Arthur </a:t>
             </a:r>
             <a:r>
               <a:rPr lang="nl-NL" dirty="0" err="1">
@@ -27881,25 +27878,7 @@
                 </a:solidFill>
                 <a:latin typeface="UGent Panno Text" panose="02000506040000040003" pitchFamily="2" charset="0"/>
               </a:rPr>
-              <a:t>Opgeslagen accounts (level, </a:t>
-            </a:r>
-            <a:r>
-              <a:rPr lang="nl-NL" sz="4000" dirty="0" err="1">
-                <a:solidFill>
-                  <a:srgbClr val="FF0000"/>
-                </a:solidFill>
-                <a:latin typeface="UGent Panno Text" panose="02000506040000040003" pitchFamily="2" charset="0"/>
-              </a:rPr>
-              <a:t>experience</a:t>
-            </a:r>
-            <a:r>
-              <a:rPr lang="nl-NL" sz="4000" dirty="0">
-                <a:solidFill>
-                  <a:srgbClr val="FF0000"/>
-                </a:solidFill>
-                <a:latin typeface="UGent Panno Text" panose="02000506040000040003" pitchFamily="2" charset="0"/>
-              </a:rPr>
-              <a:t> points…)</a:t>
+              <a:t>Opgeslagen accounts (level, experience points, …)</a:t>
             </a:r>
           </a:p>
           <a:p>
@@ -27907,7 +27886,7 @@
               <a:rPr lang="nl-NL" dirty="0">
                 <a:latin typeface="UGent Panno Text" panose="02000506040000040003" pitchFamily="2" charset="0"/>
               </a:rPr>
-              <a:t>Voldoende realistisch/ambitieus?</a:t>
+              <a:t>Voldoende realistisch / ambitieus?</a:t>
             </a:r>
           </a:p>
         </p:txBody>
@@ -29535,6 +29514,36 @@
 </p:sld>
 </file>
 
+<file path=ppt/slides/slide29.xml><?xml version="1.0" encoding="utf-8"?>
+<p:sld xmlns:a="http://schemas.openxmlformats.org/drawingml/2006/main" xmlns:r="http://schemas.openxmlformats.org/officeDocument/2006/relationships" xmlns:p="http://schemas.openxmlformats.org/presentationml/2006/main">
+  <p:cSld>
+    <p:spTree>
+      <p:nvGrpSpPr>
+        <p:cNvPr id="1" name=""/>
+        <p:cNvGrpSpPr/>
+        <p:nvPr/>
+      </p:nvGrpSpPr>
+      <p:grpSpPr>
+        <a:xfrm>
+          <a:off x="0" y="0"/>
+          <a:ext cx="0" cy="0"/>
+          <a:chOff x="0" y="0"/>
+          <a:chExt cx="0" cy="0"/>
+        </a:xfrm>
+      </p:grpSpPr>
+    </p:spTree>
+    <p:extLst>
+      <p:ext uri="{BB962C8B-B14F-4D97-AF65-F5344CB8AC3E}">
+        <p14:creationId xmlns:p14="http://schemas.microsoft.com/office/powerpoint/2010/main" val="3436022149"/>
+      </p:ext>
+    </p:extLst>
+  </p:cSld>
+  <p:clrMapOvr>
+    <a:masterClrMapping/>
+  </p:clrMapOvr>
+</p:sld>
+</file>
+
 <file path=ppt/slides/slide3.xml><?xml version="1.0" encoding="utf-8"?>
 <p:sld xmlns:a="http://schemas.openxmlformats.org/drawingml/2006/main" xmlns:r="http://schemas.openxmlformats.org/officeDocument/2006/relationships" xmlns:p="http://schemas.openxmlformats.org/presentationml/2006/main">
   <p:cSld>
@@ -29699,17 +29708,20 @@
               <a:rPr lang="nl-NL" sz="4000" dirty="0">
                 <a:latin typeface="UGent Panno Text" panose="02000506040000040003" pitchFamily="2" charset="0"/>
               </a:rPr>
-              <a:t>Meerkeuze</a:t>
+              <a:t>Meerkeuze (MC)</a:t>
             </a:r>
           </a:p>
           <a:p>
             <a:pPr lvl="1"/>
             <a:r>
-              <a:rPr lang="nl-NL" sz="4000" dirty="0">
-                <a:latin typeface="UGent Panno Text" panose="02000506040000040003" pitchFamily="2" charset="0"/>
-              </a:rPr>
-              <a:t>Instapixel</a:t>
-            </a:r>
+              <a:rPr lang="nl-NL" sz="4000">
+                <a:latin typeface="UGent Panno Text" panose="02000506040000040003" pitchFamily="2" charset="0"/>
+              </a:rPr>
+              <a:t>Instapixel (IP)</a:t>
+            </a:r>
+            <a:endParaRPr lang="nl-NL" sz="4000" dirty="0">
+              <a:latin typeface="UGent Panno Text" panose="02000506040000040003" pitchFamily="2" charset="0"/>
+            </a:endParaRPr>
           </a:p>
           <a:p>
             <a:r>

</xml_diff>